<commit_message>
add pic for book
</commit_message>
<xml_diff>
--- a/flowchart2.pptx
+++ b/flowchart2.pptx
@@ -104,6 +104,11 @@
       </a:defRPr>
     </a:lvl9pPr>
   </p:defaultTextStyle>
+  <p:extLst>
+    <p:ext uri="{EFAFB233-063F-42B5-8137-9DF3F51BA10A}">
+      <p15:sldGuideLst xmlns:p15="http://schemas.microsoft.com/office/powerpoint/2012/main"/>
+    </p:ext>
+  </p:extLst>
 </p:presentation>
 </file>
 
@@ -149,7 +154,7 @@
           </a:lstStyle>
           <a:p>
             <a:r>
-              <a:rPr lang="en-US" smtClean="0"/>
+              <a:rPr lang="en-US"/>
               <a:t>Click to edit Master title style</a:t>
             </a:r>
             <a:endParaRPr lang="he-IL"/>
@@ -214,7 +219,7 @@
           </a:lstStyle>
           <a:p>
             <a:r>
-              <a:rPr lang="en-US" smtClean="0"/>
+              <a:rPr lang="en-US"/>
               <a:t>Click to edit Master subtitle style</a:t>
             </a:r>
             <a:endParaRPr lang="he-IL"/>
@@ -238,7 +243,7 @@
           <a:p>
             <a:fld id="{80685AB0-EEAF-47F3-B9DC-B0A356C7129C}" type="datetimeFigureOut">
               <a:rPr lang="he-IL" smtClean="0"/>
-              <a:t>י"ח/טבת/תשע"ז</a:t>
+              <a:t>כ"ד/טבת/תשע"ז</a:t>
             </a:fld>
             <a:endParaRPr lang="he-IL"/>
           </a:p>
@@ -332,7 +337,7 @@
           <a:lstStyle/>
           <a:p>
             <a:r>
-              <a:rPr lang="en-US" smtClean="0"/>
+              <a:rPr lang="en-US"/>
               <a:t>Click to edit Master title style</a:t>
             </a:r>
             <a:endParaRPr lang="he-IL"/>
@@ -356,35 +361,35 @@
           <a:p>
             <a:pPr lvl="0"/>
             <a:r>
-              <a:rPr lang="en-US" smtClean="0"/>
+              <a:rPr lang="en-US"/>
               <a:t>Edit Master text styles</a:t>
             </a:r>
           </a:p>
           <a:p>
             <a:pPr lvl="1"/>
             <a:r>
-              <a:rPr lang="en-US" smtClean="0"/>
+              <a:rPr lang="en-US"/>
               <a:t>Second level</a:t>
             </a:r>
           </a:p>
           <a:p>
             <a:pPr lvl="2"/>
             <a:r>
-              <a:rPr lang="en-US" smtClean="0"/>
+              <a:rPr lang="en-US"/>
               <a:t>Third level</a:t>
             </a:r>
           </a:p>
           <a:p>
             <a:pPr lvl="3"/>
             <a:r>
-              <a:rPr lang="en-US" smtClean="0"/>
+              <a:rPr lang="en-US"/>
               <a:t>Fourth level</a:t>
             </a:r>
           </a:p>
           <a:p>
             <a:pPr lvl="4"/>
             <a:r>
-              <a:rPr lang="en-US" smtClean="0"/>
+              <a:rPr lang="en-US"/>
               <a:t>Fifth level</a:t>
             </a:r>
             <a:endParaRPr lang="he-IL"/>
@@ -408,7 +413,7 @@
           <a:p>
             <a:fld id="{80685AB0-EEAF-47F3-B9DC-B0A356C7129C}" type="datetimeFigureOut">
               <a:rPr lang="he-IL" smtClean="0"/>
-              <a:t>י"ח/טבת/תשע"ז</a:t>
+              <a:t>כ"ד/טבת/תשע"ז</a:t>
             </a:fld>
             <a:endParaRPr lang="he-IL"/>
           </a:p>
@@ -507,7 +512,7 @@
           <a:lstStyle/>
           <a:p>
             <a:r>
-              <a:rPr lang="en-US" smtClean="0"/>
+              <a:rPr lang="en-US"/>
               <a:t>Click to edit Master title style</a:t>
             </a:r>
             <a:endParaRPr lang="he-IL"/>
@@ -536,35 +541,35 @@
           <a:p>
             <a:pPr lvl="0"/>
             <a:r>
-              <a:rPr lang="en-US" smtClean="0"/>
+              <a:rPr lang="en-US"/>
               <a:t>Edit Master text styles</a:t>
             </a:r>
           </a:p>
           <a:p>
             <a:pPr lvl="1"/>
             <a:r>
-              <a:rPr lang="en-US" smtClean="0"/>
+              <a:rPr lang="en-US"/>
               <a:t>Second level</a:t>
             </a:r>
           </a:p>
           <a:p>
             <a:pPr lvl="2"/>
             <a:r>
-              <a:rPr lang="en-US" smtClean="0"/>
+              <a:rPr lang="en-US"/>
               <a:t>Third level</a:t>
             </a:r>
           </a:p>
           <a:p>
             <a:pPr lvl="3"/>
             <a:r>
-              <a:rPr lang="en-US" smtClean="0"/>
+              <a:rPr lang="en-US"/>
               <a:t>Fourth level</a:t>
             </a:r>
           </a:p>
           <a:p>
             <a:pPr lvl="4"/>
             <a:r>
-              <a:rPr lang="en-US" smtClean="0"/>
+              <a:rPr lang="en-US"/>
               <a:t>Fifth level</a:t>
             </a:r>
             <a:endParaRPr lang="he-IL"/>
@@ -588,7 +593,7 @@
           <a:p>
             <a:fld id="{80685AB0-EEAF-47F3-B9DC-B0A356C7129C}" type="datetimeFigureOut">
               <a:rPr lang="he-IL" smtClean="0"/>
-              <a:t>י"ח/טבת/תשע"ז</a:t>
+              <a:t>כ"ד/טבת/תשע"ז</a:t>
             </a:fld>
             <a:endParaRPr lang="he-IL"/>
           </a:p>
@@ -682,7 +687,7 @@
           <a:lstStyle/>
           <a:p>
             <a:r>
-              <a:rPr lang="en-US" smtClean="0"/>
+              <a:rPr lang="en-US"/>
               <a:t>Click to edit Master title style</a:t>
             </a:r>
             <a:endParaRPr lang="he-IL"/>
@@ -706,35 +711,35 @@
           <a:p>
             <a:pPr lvl="0"/>
             <a:r>
-              <a:rPr lang="en-US" smtClean="0"/>
+              <a:rPr lang="en-US"/>
               <a:t>Edit Master text styles</a:t>
             </a:r>
           </a:p>
           <a:p>
             <a:pPr lvl="1"/>
             <a:r>
-              <a:rPr lang="en-US" smtClean="0"/>
+              <a:rPr lang="en-US"/>
               <a:t>Second level</a:t>
             </a:r>
           </a:p>
           <a:p>
             <a:pPr lvl="2"/>
             <a:r>
-              <a:rPr lang="en-US" smtClean="0"/>
+              <a:rPr lang="en-US"/>
               <a:t>Third level</a:t>
             </a:r>
           </a:p>
           <a:p>
             <a:pPr lvl="3"/>
             <a:r>
-              <a:rPr lang="en-US" smtClean="0"/>
+              <a:rPr lang="en-US"/>
               <a:t>Fourth level</a:t>
             </a:r>
           </a:p>
           <a:p>
             <a:pPr lvl="4"/>
             <a:r>
-              <a:rPr lang="en-US" smtClean="0"/>
+              <a:rPr lang="en-US"/>
               <a:t>Fifth level</a:t>
             </a:r>
             <a:endParaRPr lang="he-IL"/>
@@ -758,7 +763,7 @@
           <a:p>
             <a:fld id="{80685AB0-EEAF-47F3-B9DC-B0A356C7129C}" type="datetimeFigureOut">
               <a:rPr lang="he-IL" smtClean="0"/>
-              <a:t>י"ח/טבת/תשע"ז</a:t>
+              <a:t>כ"ד/טבת/תשע"ז</a:t>
             </a:fld>
             <a:endParaRPr lang="he-IL"/>
           </a:p>
@@ -861,7 +866,7 @@
           </a:lstStyle>
           <a:p>
             <a:r>
-              <a:rPr lang="en-US" smtClean="0"/>
+              <a:rPr lang="en-US"/>
               <a:t>Click to edit Master title style</a:t>
             </a:r>
             <a:endParaRPr lang="he-IL"/>
@@ -981,7 +986,7 @@
           <a:p>
             <a:pPr lvl="0"/>
             <a:r>
-              <a:rPr lang="en-US" smtClean="0"/>
+              <a:rPr lang="en-US"/>
               <a:t>Edit Master text styles</a:t>
             </a:r>
           </a:p>
@@ -1004,7 +1009,7 @@
           <a:p>
             <a:fld id="{80685AB0-EEAF-47F3-B9DC-B0A356C7129C}" type="datetimeFigureOut">
               <a:rPr lang="he-IL" smtClean="0"/>
-              <a:t>י"ח/טבת/תשע"ז</a:t>
+              <a:t>כ"ד/טבת/תשע"ז</a:t>
             </a:fld>
             <a:endParaRPr lang="he-IL"/>
           </a:p>
@@ -1098,7 +1103,7 @@
           <a:lstStyle/>
           <a:p>
             <a:r>
-              <a:rPr lang="en-US" smtClean="0"/>
+              <a:rPr lang="en-US"/>
               <a:t>Click to edit Master title style</a:t>
             </a:r>
             <a:endParaRPr lang="he-IL"/>
@@ -1127,35 +1132,35 @@
           <a:p>
             <a:pPr lvl="0"/>
             <a:r>
-              <a:rPr lang="en-US" smtClean="0"/>
+              <a:rPr lang="en-US"/>
               <a:t>Edit Master text styles</a:t>
             </a:r>
           </a:p>
           <a:p>
             <a:pPr lvl="1"/>
             <a:r>
-              <a:rPr lang="en-US" smtClean="0"/>
+              <a:rPr lang="en-US"/>
               <a:t>Second level</a:t>
             </a:r>
           </a:p>
           <a:p>
             <a:pPr lvl="2"/>
             <a:r>
-              <a:rPr lang="en-US" smtClean="0"/>
+              <a:rPr lang="en-US"/>
               <a:t>Third level</a:t>
             </a:r>
           </a:p>
           <a:p>
             <a:pPr lvl="3"/>
             <a:r>
-              <a:rPr lang="en-US" smtClean="0"/>
+              <a:rPr lang="en-US"/>
               <a:t>Fourth level</a:t>
             </a:r>
           </a:p>
           <a:p>
             <a:pPr lvl="4"/>
             <a:r>
-              <a:rPr lang="en-US" smtClean="0"/>
+              <a:rPr lang="en-US"/>
               <a:t>Fifth level</a:t>
             </a:r>
             <a:endParaRPr lang="he-IL"/>
@@ -1184,35 +1189,35 @@
           <a:p>
             <a:pPr lvl="0"/>
             <a:r>
-              <a:rPr lang="en-US" smtClean="0"/>
+              <a:rPr lang="en-US"/>
               <a:t>Edit Master text styles</a:t>
             </a:r>
           </a:p>
           <a:p>
             <a:pPr lvl="1"/>
             <a:r>
-              <a:rPr lang="en-US" smtClean="0"/>
+              <a:rPr lang="en-US"/>
               <a:t>Second level</a:t>
             </a:r>
           </a:p>
           <a:p>
             <a:pPr lvl="2"/>
             <a:r>
-              <a:rPr lang="en-US" smtClean="0"/>
+              <a:rPr lang="en-US"/>
               <a:t>Third level</a:t>
             </a:r>
           </a:p>
           <a:p>
             <a:pPr lvl="3"/>
             <a:r>
-              <a:rPr lang="en-US" smtClean="0"/>
+              <a:rPr lang="en-US"/>
               <a:t>Fourth level</a:t>
             </a:r>
           </a:p>
           <a:p>
             <a:pPr lvl="4"/>
             <a:r>
-              <a:rPr lang="en-US" smtClean="0"/>
+              <a:rPr lang="en-US"/>
               <a:t>Fifth level</a:t>
             </a:r>
             <a:endParaRPr lang="he-IL"/>
@@ -1236,7 +1241,7 @@
           <a:p>
             <a:fld id="{80685AB0-EEAF-47F3-B9DC-B0A356C7129C}" type="datetimeFigureOut">
               <a:rPr lang="he-IL" smtClean="0"/>
-              <a:t>י"ח/טבת/תשע"ז</a:t>
+              <a:t>כ"ד/טבת/תשע"ז</a:t>
             </a:fld>
             <a:endParaRPr lang="he-IL"/>
           </a:p>
@@ -1335,7 +1340,7 @@
           <a:lstStyle/>
           <a:p>
             <a:r>
-              <a:rPr lang="en-US" smtClean="0"/>
+              <a:rPr lang="en-US"/>
               <a:t>Click to edit Master title style</a:t>
             </a:r>
             <a:endParaRPr lang="he-IL"/>
@@ -1401,7 +1406,7 @@
           <a:p>
             <a:pPr lvl="0"/>
             <a:r>
-              <a:rPr lang="en-US" smtClean="0"/>
+              <a:rPr lang="en-US"/>
               <a:t>Edit Master text styles</a:t>
             </a:r>
           </a:p>
@@ -1429,35 +1434,35 @@
           <a:p>
             <a:pPr lvl="0"/>
             <a:r>
-              <a:rPr lang="en-US" smtClean="0"/>
+              <a:rPr lang="en-US"/>
               <a:t>Edit Master text styles</a:t>
             </a:r>
           </a:p>
           <a:p>
             <a:pPr lvl="1"/>
             <a:r>
-              <a:rPr lang="en-US" smtClean="0"/>
+              <a:rPr lang="en-US"/>
               <a:t>Second level</a:t>
             </a:r>
           </a:p>
           <a:p>
             <a:pPr lvl="2"/>
             <a:r>
-              <a:rPr lang="en-US" smtClean="0"/>
+              <a:rPr lang="en-US"/>
               <a:t>Third level</a:t>
             </a:r>
           </a:p>
           <a:p>
             <a:pPr lvl="3"/>
             <a:r>
-              <a:rPr lang="en-US" smtClean="0"/>
+              <a:rPr lang="en-US"/>
               <a:t>Fourth level</a:t>
             </a:r>
           </a:p>
           <a:p>
             <a:pPr lvl="4"/>
             <a:r>
-              <a:rPr lang="en-US" smtClean="0"/>
+              <a:rPr lang="en-US"/>
               <a:t>Fifth level</a:t>
             </a:r>
             <a:endParaRPr lang="he-IL"/>
@@ -1523,7 +1528,7 @@
           <a:p>
             <a:pPr lvl="0"/>
             <a:r>
-              <a:rPr lang="en-US" smtClean="0"/>
+              <a:rPr lang="en-US"/>
               <a:t>Edit Master text styles</a:t>
             </a:r>
           </a:p>
@@ -1551,35 +1556,35 @@
           <a:p>
             <a:pPr lvl="0"/>
             <a:r>
-              <a:rPr lang="en-US" smtClean="0"/>
+              <a:rPr lang="en-US"/>
               <a:t>Edit Master text styles</a:t>
             </a:r>
           </a:p>
           <a:p>
             <a:pPr lvl="1"/>
             <a:r>
-              <a:rPr lang="en-US" smtClean="0"/>
+              <a:rPr lang="en-US"/>
               <a:t>Second level</a:t>
             </a:r>
           </a:p>
           <a:p>
             <a:pPr lvl="2"/>
             <a:r>
-              <a:rPr lang="en-US" smtClean="0"/>
+              <a:rPr lang="en-US"/>
               <a:t>Third level</a:t>
             </a:r>
           </a:p>
           <a:p>
             <a:pPr lvl="3"/>
             <a:r>
-              <a:rPr lang="en-US" smtClean="0"/>
+              <a:rPr lang="en-US"/>
               <a:t>Fourth level</a:t>
             </a:r>
           </a:p>
           <a:p>
             <a:pPr lvl="4"/>
             <a:r>
-              <a:rPr lang="en-US" smtClean="0"/>
+              <a:rPr lang="en-US"/>
               <a:t>Fifth level</a:t>
             </a:r>
             <a:endParaRPr lang="he-IL"/>
@@ -1603,7 +1608,7 @@
           <a:p>
             <a:fld id="{80685AB0-EEAF-47F3-B9DC-B0A356C7129C}" type="datetimeFigureOut">
               <a:rPr lang="he-IL" smtClean="0"/>
-              <a:t>י"ח/טבת/תשע"ז</a:t>
+              <a:t>כ"ד/טבת/תשע"ז</a:t>
             </a:fld>
             <a:endParaRPr lang="he-IL"/>
           </a:p>
@@ -1697,7 +1702,7 @@
           <a:lstStyle/>
           <a:p>
             <a:r>
-              <a:rPr lang="en-US" smtClean="0"/>
+              <a:rPr lang="en-US"/>
               <a:t>Click to edit Master title style</a:t>
             </a:r>
             <a:endParaRPr lang="he-IL"/>
@@ -1721,7 +1726,7 @@
           <a:p>
             <a:fld id="{80685AB0-EEAF-47F3-B9DC-B0A356C7129C}" type="datetimeFigureOut">
               <a:rPr lang="he-IL" smtClean="0"/>
-              <a:t>י"ח/טבת/תשע"ז</a:t>
+              <a:t>כ"ד/טבת/תשע"ז</a:t>
             </a:fld>
             <a:endParaRPr lang="he-IL"/>
           </a:p>
@@ -1816,7 +1821,7 @@
           <a:p>
             <a:fld id="{80685AB0-EEAF-47F3-B9DC-B0A356C7129C}" type="datetimeFigureOut">
               <a:rPr lang="he-IL" smtClean="0"/>
-              <a:t>י"ח/טבת/תשע"ז</a:t>
+              <a:t>כ"ד/טבת/תשע"ז</a:t>
             </a:fld>
             <a:endParaRPr lang="he-IL"/>
           </a:p>
@@ -1919,7 +1924,7 @@
           </a:lstStyle>
           <a:p>
             <a:r>
-              <a:rPr lang="en-US" smtClean="0"/>
+              <a:rPr lang="en-US"/>
               <a:t>Click to edit Master title style</a:t>
             </a:r>
             <a:endParaRPr lang="he-IL"/>
@@ -1976,35 +1981,35 @@
           <a:p>
             <a:pPr lvl="0"/>
             <a:r>
-              <a:rPr lang="en-US" smtClean="0"/>
+              <a:rPr lang="en-US"/>
               <a:t>Edit Master text styles</a:t>
             </a:r>
           </a:p>
           <a:p>
             <a:pPr lvl="1"/>
             <a:r>
-              <a:rPr lang="en-US" smtClean="0"/>
+              <a:rPr lang="en-US"/>
               <a:t>Second level</a:t>
             </a:r>
           </a:p>
           <a:p>
             <a:pPr lvl="2"/>
             <a:r>
-              <a:rPr lang="en-US" smtClean="0"/>
+              <a:rPr lang="en-US"/>
               <a:t>Third level</a:t>
             </a:r>
           </a:p>
           <a:p>
             <a:pPr lvl="3"/>
             <a:r>
-              <a:rPr lang="en-US" smtClean="0"/>
+              <a:rPr lang="en-US"/>
               <a:t>Fourth level</a:t>
             </a:r>
           </a:p>
           <a:p>
             <a:pPr lvl="4"/>
             <a:r>
-              <a:rPr lang="en-US" smtClean="0"/>
+              <a:rPr lang="en-US"/>
               <a:t>Fifth level</a:t>
             </a:r>
             <a:endParaRPr lang="he-IL"/>
@@ -2070,7 +2075,7 @@
           <a:p>
             <a:pPr lvl="0"/>
             <a:r>
-              <a:rPr lang="en-US" smtClean="0"/>
+              <a:rPr lang="en-US"/>
               <a:t>Edit Master text styles</a:t>
             </a:r>
           </a:p>
@@ -2093,7 +2098,7 @@
           <a:p>
             <a:fld id="{80685AB0-EEAF-47F3-B9DC-B0A356C7129C}" type="datetimeFigureOut">
               <a:rPr lang="he-IL" smtClean="0"/>
-              <a:t>י"ח/טבת/תשע"ז</a:t>
+              <a:t>כ"ד/טבת/תשע"ז</a:t>
             </a:fld>
             <a:endParaRPr lang="he-IL"/>
           </a:p>
@@ -2196,7 +2201,7 @@
           </a:lstStyle>
           <a:p>
             <a:r>
-              <a:rPr lang="en-US" smtClean="0"/>
+              <a:rPr lang="en-US"/>
               <a:t>Click to edit Master title style</a:t>
             </a:r>
             <a:endParaRPr lang="he-IL"/>
@@ -2323,7 +2328,7 @@
           <a:p>
             <a:pPr lvl="0"/>
             <a:r>
-              <a:rPr lang="en-US" smtClean="0"/>
+              <a:rPr lang="en-US"/>
               <a:t>Edit Master text styles</a:t>
             </a:r>
           </a:p>
@@ -2346,7 +2351,7 @@
           <a:p>
             <a:fld id="{80685AB0-EEAF-47F3-B9DC-B0A356C7129C}" type="datetimeFigureOut">
               <a:rPr lang="he-IL" smtClean="0"/>
-              <a:t>י"ח/טבת/תשע"ז</a:t>
+              <a:t>כ"ד/טבת/תשע"ז</a:t>
             </a:fld>
             <a:endParaRPr lang="he-IL"/>
           </a:p>
@@ -2455,7 +2460,7 @@
           <a:lstStyle/>
           <a:p>
             <a:r>
-              <a:rPr lang="en-US" smtClean="0"/>
+              <a:rPr lang="en-US"/>
               <a:t>Click to edit Master title style</a:t>
             </a:r>
             <a:endParaRPr lang="he-IL"/>
@@ -2489,35 +2494,35 @@
           <a:p>
             <a:pPr lvl="0"/>
             <a:r>
-              <a:rPr lang="en-US" smtClean="0"/>
+              <a:rPr lang="en-US"/>
               <a:t>Edit Master text styles</a:t>
             </a:r>
           </a:p>
           <a:p>
             <a:pPr lvl="1"/>
             <a:r>
-              <a:rPr lang="en-US" smtClean="0"/>
+              <a:rPr lang="en-US"/>
               <a:t>Second level</a:t>
             </a:r>
           </a:p>
           <a:p>
             <a:pPr lvl="2"/>
             <a:r>
-              <a:rPr lang="en-US" smtClean="0"/>
+              <a:rPr lang="en-US"/>
               <a:t>Third level</a:t>
             </a:r>
           </a:p>
           <a:p>
             <a:pPr lvl="3"/>
             <a:r>
-              <a:rPr lang="en-US" smtClean="0"/>
+              <a:rPr lang="en-US"/>
               <a:t>Fourth level</a:t>
             </a:r>
           </a:p>
           <a:p>
             <a:pPr lvl="4"/>
             <a:r>
-              <a:rPr lang="en-US" smtClean="0"/>
+              <a:rPr lang="en-US"/>
               <a:t>Fifth level</a:t>
             </a:r>
             <a:endParaRPr lang="he-IL"/>
@@ -2559,7 +2564,7 @@
           <a:p>
             <a:fld id="{80685AB0-EEAF-47F3-B9DC-B0A356C7129C}" type="datetimeFigureOut">
               <a:rPr lang="he-IL" smtClean="0"/>
-              <a:t>י"ח/טבת/תשע"ז</a:t>
+              <a:t>כ"ד/טבת/תשע"ז</a:t>
             </a:fld>
             <a:endParaRPr lang="he-IL"/>
           </a:p>
@@ -2972,10 +2977,98 @@
         </p:nvSpPr>
         <p:spPr>
           <a:xfrm>
-            <a:off x="1423554" y="865609"/>
-            <a:ext cx="1571106" cy="789709"/>
+            <a:off x="1410303" y="1051140"/>
+            <a:ext cx="1637698" cy="789709"/>
           </a:xfrm>
           <a:prstGeom prst="ellipse">
+            <a:avLst/>
+          </a:prstGeom>
+        </p:spPr>
+        <p:style>
+          <a:lnRef idx="2">
+            <a:schemeClr val="accent2">
+              <a:shade val="50000"/>
+            </a:schemeClr>
+          </a:lnRef>
+          <a:fillRef idx="1">
+            <a:schemeClr val="accent2"/>
+          </a:fillRef>
+          <a:effectRef idx="0">
+            <a:schemeClr val="accent2"/>
+          </a:effectRef>
+          <a:fontRef idx="minor">
+            <a:schemeClr val="lt1"/>
+          </a:fontRef>
+        </p:style>
+        <p:txBody>
+          <a:bodyPr rtlCol="1" anchor="ctr"/>
+          <a:lstStyle/>
+          <a:p>
+            <a:pPr algn="ctr"/>
+            <a:r>
+              <a:rPr lang="en-US" sz="1400" dirty="0"/>
+              <a:t>Select requirement </a:t>
+            </a:r>
+            <a:endParaRPr lang="he-IL" sz="1400" dirty="0"/>
+          </a:p>
+        </p:txBody>
+      </p:sp>
+      <p:sp>
+        <p:nvSpPr>
+          <p:cNvPr id="4" name="Rounded Rectangle 3"/>
+          <p:cNvSpPr/>
+          <p:nvPr/>
+        </p:nvSpPr>
+        <p:spPr>
+          <a:xfrm>
+            <a:off x="3556371" y="365742"/>
+            <a:ext cx="1230283" cy="257694"/>
+          </a:xfrm>
+          <a:prstGeom prst="roundRect">
+            <a:avLst>
+              <a:gd name="adj" fmla="val 26344"/>
+            </a:avLst>
+          </a:prstGeom>
+        </p:spPr>
+        <p:style>
+          <a:lnRef idx="1">
+            <a:schemeClr val="accent1"/>
+          </a:lnRef>
+          <a:fillRef idx="3">
+            <a:schemeClr val="accent1"/>
+          </a:fillRef>
+          <a:effectRef idx="2">
+            <a:schemeClr val="accent1"/>
+          </a:effectRef>
+          <a:fontRef idx="minor">
+            <a:schemeClr val="lt1"/>
+          </a:fontRef>
+        </p:style>
+        <p:txBody>
+          <a:bodyPr rtlCol="1" anchor="ctr"/>
+          <a:lstStyle/>
+          <a:p>
+            <a:pPr algn="ctr"/>
+            <a:r>
+              <a:rPr lang="en-US" sz="1400" dirty="0"/>
+              <a:t>Begin verify</a:t>
+            </a:r>
+            <a:endParaRPr lang="he-IL" sz="1400" dirty="0"/>
+          </a:p>
+        </p:txBody>
+      </p:sp>
+      <p:sp>
+        <p:nvSpPr>
+          <p:cNvPr id="5" name="Rectangle 4"/>
+          <p:cNvSpPr/>
+          <p:nvPr/>
+        </p:nvSpPr>
+        <p:spPr>
+          <a:xfrm>
+            <a:off x="1497632" y="2657547"/>
+            <a:ext cx="1463040" cy="534715"/>
+          </a:xfrm>
+          <a:prstGeom prst="rect">
             <a:avLst/>
           </a:prstGeom>
         </p:spPr>
@@ -3001,8 +3094,8 @@
           <a:p>
             <a:pPr algn="ctr"/>
             <a:r>
-              <a:rPr lang="en-US" sz="1400" dirty="0" smtClean="0"/>
-              <a:t>Select requirement </a:t>
+              <a:rPr lang="en-US" sz="1400" dirty="0"/>
+              <a:t>Requirements </a:t>
             </a:r>
             <a:endParaRPr lang="he-IL" sz="1400" dirty="0"/>
           </a:p>
@@ -3010,19 +3103,17 @@
       </p:sp>
       <p:sp>
         <p:nvSpPr>
-          <p:cNvPr id="4" name="Rounded Rectangle 3"/>
+          <p:cNvPr id="7" name="Rectangle 6"/>
           <p:cNvSpPr/>
           <p:nvPr/>
         </p:nvSpPr>
         <p:spPr>
           <a:xfrm>
-            <a:off x="3579322" y="339803"/>
-            <a:ext cx="1230283" cy="257694"/>
-          </a:xfrm>
-          <a:prstGeom prst="roundRect">
-            <a:avLst>
-              <a:gd name="adj" fmla="val 26344"/>
-            </a:avLst>
+            <a:off x="5530643" y="1011199"/>
+            <a:ext cx="1036320" cy="450860"/>
+          </a:xfrm>
+          <a:prstGeom prst="rect">
+            <a:avLst/>
           </a:prstGeom>
         </p:spPr>
         <p:style>
@@ -3047,8 +3138,8 @@
           <a:p>
             <a:pPr algn="ctr"/>
             <a:r>
-              <a:rPr lang="en-US" sz="1400" dirty="0" smtClean="0"/>
-              <a:t>Begin verify</a:t>
+              <a:rPr lang="en-US" sz="1400" dirty="0"/>
+              <a:t>Spec</a:t>
             </a:r>
             <a:endParaRPr lang="he-IL" sz="1400" dirty="0"/>
           </a:p>
@@ -3056,14 +3147,58 @@
       </p:sp>
       <p:sp>
         <p:nvSpPr>
-          <p:cNvPr id="5" name="Rectangle 4"/>
+          <p:cNvPr id="8" name="Oval 7"/>
           <p:cNvSpPr/>
           <p:nvPr/>
         </p:nvSpPr>
         <p:spPr>
           <a:xfrm>
-            <a:off x="1477587" y="1843183"/>
-            <a:ext cx="1463040" cy="534715"/>
+            <a:off x="5320059" y="1638669"/>
+            <a:ext cx="1415932" cy="751058"/>
+          </a:xfrm>
+          <a:prstGeom prst="ellipse">
+            <a:avLst/>
+          </a:prstGeom>
+        </p:spPr>
+        <p:style>
+          <a:lnRef idx="2">
+            <a:schemeClr val="accent2">
+              <a:shade val="50000"/>
+            </a:schemeClr>
+          </a:lnRef>
+          <a:fillRef idx="1">
+            <a:schemeClr val="accent2"/>
+          </a:fillRef>
+          <a:effectRef idx="0">
+            <a:schemeClr val="accent2"/>
+          </a:effectRef>
+          <a:fontRef idx="minor">
+            <a:schemeClr val="lt1"/>
+          </a:fontRef>
+        </p:style>
+        <p:txBody>
+          <a:bodyPr rtlCol="1" anchor="ctr"/>
+          <a:lstStyle/>
+          <a:p>
+            <a:pPr algn="ctr"/>
+            <a:r>
+              <a:rPr lang="en-US" sz="1400" dirty="0"/>
+              <a:t>Translation to PROMELA</a:t>
+            </a:r>
+            <a:endParaRPr lang="he-IL" sz="1400" dirty="0"/>
+          </a:p>
+        </p:txBody>
+      </p:sp>
+      <p:sp>
+        <p:nvSpPr>
+          <p:cNvPr id="9" name="Rectangle 8"/>
+          <p:cNvSpPr/>
+          <p:nvPr/>
+        </p:nvSpPr>
+        <p:spPr>
+          <a:xfrm>
+            <a:off x="5358528" y="2646230"/>
+            <a:ext cx="1338993" cy="534715"/>
           </a:xfrm>
           <a:prstGeom prst="rect">
             <a:avLst/>
@@ -3091,8 +3226,8 @@
           <a:p>
             <a:pPr algn="ctr"/>
             <a:r>
-              <a:rPr lang="en-US" sz="1400" dirty="0" smtClean="0"/>
-              <a:t>Requirements </a:t>
+              <a:rPr lang="en-US" sz="1400" dirty="0"/>
+              <a:t>PROMELA model </a:t>
             </a:r>
             <a:endParaRPr lang="he-IL" sz="1400" dirty="0"/>
           </a:p>
@@ -3100,14 +3235,58 @@
       </p:sp>
       <p:sp>
         <p:nvSpPr>
-          <p:cNvPr id="7" name="Rectangle 6"/>
+          <p:cNvPr id="10" name="Oval 9"/>
           <p:cNvSpPr/>
           <p:nvPr/>
         </p:nvSpPr>
         <p:spPr>
           <a:xfrm>
-            <a:off x="5527964" y="243220"/>
-            <a:ext cx="1036320" cy="450860"/>
+            <a:off x="3246727" y="2518818"/>
+            <a:ext cx="1638989" cy="789709"/>
+          </a:xfrm>
+          <a:prstGeom prst="ellipse">
+            <a:avLst/>
+          </a:prstGeom>
+        </p:spPr>
+        <p:style>
+          <a:lnRef idx="2">
+            <a:schemeClr val="accent2">
+              <a:shade val="50000"/>
+            </a:schemeClr>
+          </a:lnRef>
+          <a:fillRef idx="1">
+            <a:schemeClr val="accent2"/>
+          </a:fillRef>
+          <a:effectRef idx="0">
+            <a:schemeClr val="accent2"/>
+          </a:effectRef>
+          <a:fontRef idx="minor">
+            <a:schemeClr val="lt1"/>
+          </a:fontRef>
+        </p:style>
+        <p:txBody>
+          <a:bodyPr rtlCol="1" anchor="ctr"/>
+          <a:lstStyle/>
+          <a:p>
+            <a:pPr algn="ctr"/>
+            <a:r>
+              <a:rPr lang="en-US" sz="1400" dirty="0"/>
+              <a:t>Verify using SPIN</a:t>
+            </a:r>
+            <a:endParaRPr lang="he-IL" sz="1400" dirty="0"/>
+          </a:p>
+        </p:txBody>
+      </p:sp>
+      <p:sp>
+        <p:nvSpPr>
+          <p:cNvPr id="11" name="Rectangle 10"/>
+          <p:cNvSpPr/>
+          <p:nvPr/>
+        </p:nvSpPr>
+        <p:spPr>
+          <a:xfrm>
+            <a:off x="3234948" y="3630332"/>
+            <a:ext cx="1662545" cy="523702"/>
           </a:xfrm>
           <a:prstGeom prst="rect">
             <a:avLst/>
@@ -3135,8 +3314,8 @@
           <a:p>
             <a:pPr algn="ctr"/>
             <a:r>
-              <a:rPr lang="en-US" sz="1400" dirty="0" smtClean="0"/>
-              <a:t>Spec</a:t>
+              <a:rPr lang="en-US" sz="1400" dirty="0"/>
+              <a:t>Verification result</a:t>
             </a:r>
             <a:endParaRPr lang="he-IL" sz="1400" dirty="0"/>
           </a:p>
@@ -3144,30 +3323,30 @@
       </p:sp>
       <p:sp>
         <p:nvSpPr>
-          <p:cNvPr id="8" name="Oval 7"/>
+          <p:cNvPr id="12" name="Flowchart: Decision 11"/>
           <p:cNvSpPr/>
           <p:nvPr/>
         </p:nvSpPr>
         <p:spPr>
           <a:xfrm>
-            <a:off x="5260571" y="884935"/>
-            <a:ext cx="1571106" cy="751058"/>
-          </a:xfrm>
-          <a:prstGeom prst="ellipse">
+            <a:off x="3466665" y="4354361"/>
+            <a:ext cx="1211352" cy="689956"/>
+          </a:xfrm>
+          <a:prstGeom prst="flowChartDecision">
             <a:avLst/>
           </a:prstGeom>
         </p:spPr>
         <p:style>
           <a:lnRef idx="2">
-            <a:schemeClr val="accent1">
+            <a:schemeClr val="accent6">
               <a:shade val="50000"/>
             </a:schemeClr>
           </a:lnRef>
           <a:fillRef idx="1">
-            <a:schemeClr val="accent1"/>
+            <a:schemeClr val="accent6"/>
           </a:fillRef>
           <a:effectRef idx="0">
-            <a:schemeClr val="accent1"/>
+            <a:schemeClr val="accent6"/>
           </a:effectRef>
           <a:fontRef idx="minor">
             <a:schemeClr val="lt1"/>
@@ -3179,8 +3358,8 @@
           <a:p>
             <a:pPr algn="ctr"/>
             <a:r>
-              <a:rPr lang="en-US" sz="1400" dirty="0" smtClean="0"/>
-              <a:t>Translation to PROMELA</a:t>
+              <a:rPr lang="en-US" sz="1400" dirty="0"/>
+              <a:t>Is pass </a:t>
             </a:r>
             <a:endParaRPr lang="he-IL" sz="1400" dirty="0"/>
           </a:p>
@@ -3188,30 +3367,30 @@
       </p:sp>
       <p:sp>
         <p:nvSpPr>
-          <p:cNvPr id="9" name="Rectangle 8"/>
+          <p:cNvPr id="13" name="Oval 12"/>
           <p:cNvSpPr/>
           <p:nvPr/>
         </p:nvSpPr>
         <p:spPr>
           <a:xfrm>
-            <a:off x="5309756" y="1785235"/>
-            <a:ext cx="1463040" cy="534715"/>
-          </a:xfrm>
-          <a:prstGeom prst="rect">
+            <a:off x="4796353" y="5021297"/>
+            <a:ext cx="2187543" cy="791279"/>
+          </a:xfrm>
+          <a:prstGeom prst="ellipse">
             <a:avLst/>
           </a:prstGeom>
         </p:spPr>
         <p:style>
           <a:lnRef idx="2">
-            <a:schemeClr val="accent1">
+            <a:schemeClr val="accent2">
               <a:shade val="50000"/>
             </a:schemeClr>
           </a:lnRef>
           <a:fillRef idx="1">
-            <a:schemeClr val="accent1"/>
+            <a:schemeClr val="accent2"/>
           </a:fillRef>
           <a:effectRef idx="0">
-            <a:schemeClr val="accent1"/>
+            <a:schemeClr val="accent2"/>
           </a:effectRef>
           <a:fontRef idx="minor">
             <a:schemeClr val="lt1"/>
@@ -3223,8 +3402,15 @@
           <a:p>
             <a:pPr algn="ctr"/>
             <a:r>
-              <a:rPr lang="en-US" sz="1400" dirty="0" smtClean="0"/>
-              <a:t>PROMELA model </a:t>
+              <a:rPr lang="en-US" sz="1400" dirty="0"/>
+              <a:t>Show </a:t>
+            </a:r>
+            <a:br>
+              <a:rPr lang="en-US" sz="1400" dirty="0"/>
+            </a:br>
+            <a:r>
+              <a:rPr lang="en-US" sz="1400" dirty="0"/>
+              <a:t>“ requirement was fulfilled in spec” </a:t>
             </a:r>
             <a:endParaRPr lang="he-IL" sz="1400" dirty="0"/>
           </a:p>
@@ -3232,14 +3418,14 @@
       </p:sp>
       <p:sp>
         <p:nvSpPr>
-          <p:cNvPr id="10" name="Oval 9"/>
+          <p:cNvPr id="14" name="Oval 13"/>
           <p:cNvSpPr/>
           <p:nvPr/>
         </p:nvSpPr>
         <p:spPr>
           <a:xfrm>
-            <a:off x="2337262" y="2468563"/>
-            <a:ext cx="3470564" cy="789709"/>
+            <a:off x="1199369" y="5021297"/>
+            <a:ext cx="2035579" cy="791279"/>
           </a:xfrm>
           <a:prstGeom prst="ellipse">
             <a:avLst/>
@@ -3247,15 +3433,15 @@
         </p:spPr>
         <p:style>
           <a:lnRef idx="2">
-            <a:schemeClr val="accent1">
+            <a:schemeClr val="accent2">
               <a:shade val="50000"/>
             </a:schemeClr>
           </a:lnRef>
           <a:fillRef idx="1">
-            <a:schemeClr val="accent1"/>
+            <a:schemeClr val="accent2"/>
           </a:fillRef>
           <a:effectRef idx="0">
-            <a:schemeClr val="accent1"/>
+            <a:schemeClr val="accent2"/>
           </a:effectRef>
           <a:fontRef idx="minor">
             <a:schemeClr val="lt1"/>
@@ -3267,8 +3453,15 @@
           <a:p>
             <a:pPr algn="ctr"/>
             <a:r>
-              <a:rPr lang="en-US" sz="1400" dirty="0" smtClean="0"/>
-              <a:t>Verify using SPIN</a:t>
+              <a:rPr lang="en-US" sz="1400" dirty="0"/>
+              <a:t>Show </a:t>
+            </a:r>
+            <a:br>
+              <a:rPr lang="en-US" sz="1400" dirty="0"/>
+            </a:br>
+            <a:r>
+              <a:rPr lang="en-US" sz="1400" dirty="0"/>
+              <a:t>Counter-example</a:t>
             </a:r>
             <a:endParaRPr lang="he-IL" sz="1400" dirty="0"/>
           </a:p>
@@ -3276,30 +3469,30 @@
       </p:sp>
       <p:sp>
         <p:nvSpPr>
-          <p:cNvPr id="11" name="Rectangle 10"/>
+          <p:cNvPr id="15" name="Oval 14"/>
           <p:cNvSpPr/>
           <p:nvPr/>
         </p:nvSpPr>
         <p:spPr>
           <a:xfrm>
-            <a:off x="3236422" y="3564712"/>
-            <a:ext cx="1662545" cy="523702"/>
-          </a:xfrm>
-          <a:prstGeom prst="rect">
+            <a:off x="3161517" y="5913148"/>
+            <a:ext cx="1634837" cy="798022"/>
+          </a:xfrm>
+          <a:prstGeom prst="ellipse">
             <a:avLst/>
           </a:prstGeom>
         </p:spPr>
         <p:style>
           <a:lnRef idx="2">
-            <a:schemeClr val="accent1">
+            <a:schemeClr val="accent2">
               <a:shade val="50000"/>
             </a:schemeClr>
           </a:lnRef>
           <a:fillRef idx="1">
-            <a:schemeClr val="accent1"/>
+            <a:schemeClr val="accent2"/>
           </a:fillRef>
           <a:effectRef idx="0">
-            <a:schemeClr val="accent1"/>
+            <a:schemeClr val="accent2"/>
           </a:effectRef>
           <a:fontRef idx="minor">
             <a:schemeClr val="lt1"/>
@@ -3311,294 +3504,30 @@
           <a:p>
             <a:pPr algn="ctr"/>
             <a:r>
-              <a:rPr lang="en-US" sz="1400" dirty="0" smtClean="0"/>
-              <a:t>Verification result</a:t>
+              <a:rPr lang="en-US" sz="1400" dirty="0"/>
+              <a:t>Show spec environment </a:t>
             </a:r>
             <a:endParaRPr lang="he-IL" sz="1400" dirty="0"/>
           </a:p>
         </p:txBody>
       </p:sp>
-      <p:sp>
-        <p:nvSpPr>
-          <p:cNvPr id="12" name="Flowchart: Decision 11"/>
-          <p:cNvSpPr/>
-          <p:nvPr/>
-        </p:nvSpPr>
-        <p:spPr>
-          <a:xfrm>
-            <a:off x="3468139" y="4290309"/>
-            <a:ext cx="1199110" cy="689956"/>
-          </a:xfrm>
-          <a:prstGeom prst="flowChartDecision">
-            <a:avLst/>
-          </a:prstGeom>
-        </p:spPr>
-        <p:style>
-          <a:lnRef idx="2">
-            <a:schemeClr val="accent1">
-              <a:shade val="50000"/>
-            </a:schemeClr>
-          </a:lnRef>
-          <a:fillRef idx="1">
-            <a:schemeClr val="accent1"/>
-          </a:fillRef>
-          <a:effectRef idx="0">
-            <a:schemeClr val="accent1"/>
-          </a:effectRef>
-          <a:fontRef idx="minor">
-            <a:schemeClr val="lt1"/>
-          </a:fontRef>
-        </p:style>
-        <p:txBody>
-          <a:bodyPr rtlCol="1" anchor="ctr"/>
-          <a:lstStyle/>
-          <a:p>
-            <a:pPr algn="ctr"/>
-            <a:r>
-              <a:rPr lang="en-US" dirty="0" smtClean="0"/>
-              <a:t>Is pass </a:t>
-            </a:r>
-            <a:endParaRPr lang="he-IL" dirty="0"/>
-          </a:p>
-        </p:txBody>
-      </p:sp>
-      <p:sp>
-        <p:nvSpPr>
-          <p:cNvPr id="13" name="Oval 12"/>
-          <p:cNvSpPr/>
-          <p:nvPr/>
-        </p:nvSpPr>
-        <p:spPr>
-          <a:xfrm>
-            <a:off x="4809605" y="4835766"/>
-            <a:ext cx="2168236" cy="791279"/>
-          </a:xfrm>
-          <a:prstGeom prst="ellipse">
-            <a:avLst/>
-          </a:prstGeom>
-        </p:spPr>
-        <p:style>
-          <a:lnRef idx="2">
-            <a:schemeClr val="accent1">
-              <a:shade val="50000"/>
-            </a:schemeClr>
-          </a:lnRef>
-          <a:fillRef idx="1">
-            <a:schemeClr val="accent1"/>
-          </a:fillRef>
-          <a:effectRef idx="0">
-            <a:schemeClr val="accent1"/>
-          </a:effectRef>
-          <a:fontRef idx="minor">
-            <a:schemeClr val="lt1"/>
-          </a:fontRef>
-        </p:style>
-        <p:txBody>
-          <a:bodyPr rtlCol="1" anchor="ctr"/>
-          <a:lstStyle/>
-          <a:p>
-            <a:pPr algn="ctr"/>
-            <a:r>
-              <a:rPr lang="en-US" sz="1400" dirty="0" smtClean="0"/>
-              <a:t>Show </a:t>
-            </a:r>
-            <a:br>
-              <a:rPr lang="en-US" sz="1400" dirty="0" smtClean="0"/>
-            </a:br>
-            <a:r>
-              <a:rPr lang="en-US" sz="1400" dirty="0" smtClean="0"/>
-              <a:t>“ requirement was fulfilled in spec” </a:t>
-            </a:r>
-            <a:endParaRPr lang="he-IL" sz="1400" dirty="0"/>
-          </a:p>
-        </p:txBody>
-      </p:sp>
-      <p:sp>
-        <p:nvSpPr>
-          <p:cNvPr id="14" name="Oval 13"/>
-          <p:cNvSpPr/>
-          <p:nvPr/>
-        </p:nvSpPr>
-        <p:spPr>
-          <a:xfrm>
-            <a:off x="1212620" y="4835766"/>
-            <a:ext cx="2168236" cy="791279"/>
-          </a:xfrm>
-          <a:prstGeom prst="ellipse">
-            <a:avLst/>
-          </a:prstGeom>
-        </p:spPr>
-        <p:style>
-          <a:lnRef idx="2">
-            <a:schemeClr val="accent1">
-              <a:shade val="50000"/>
-            </a:schemeClr>
-          </a:lnRef>
-          <a:fillRef idx="1">
-            <a:schemeClr val="accent1"/>
-          </a:fillRef>
-          <a:effectRef idx="0">
-            <a:schemeClr val="accent1"/>
-          </a:effectRef>
-          <a:fontRef idx="minor">
-            <a:schemeClr val="lt1"/>
-          </a:fontRef>
-        </p:style>
-        <p:txBody>
-          <a:bodyPr rtlCol="1" anchor="ctr"/>
-          <a:lstStyle/>
-          <a:p>
-            <a:pPr algn="ctr"/>
-            <a:r>
-              <a:rPr lang="en-US" sz="1400" dirty="0" smtClean="0"/>
-              <a:t>Show </a:t>
-            </a:r>
-            <a:br>
-              <a:rPr lang="en-US" sz="1400" dirty="0" smtClean="0"/>
-            </a:br>
-            <a:r>
-              <a:rPr lang="en-US" sz="1400" dirty="0" smtClean="0"/>
-              <a:t>Counter-example</a:t>
-            </a:r>
-            <a:endParaRPr lang="he-IL" sz="1400" dirty="0"/>
-          </a:p>
-        </p:txBody>
-      </p:sp>
-      <p:sp>
-        <p:nvSpPr>
-          <p:cNvPr id="15" name="Oval 14"/>
-          <p:cNvSpPr/>
-          <p:nvPr/>
-        </p:nvSpPr>
-        <p:spPr>
-          <a:xfrm>
-            <a:off x="3174768" y="5727617"/>
-            <a:ext cx="2019993" cy="798022"/>
-          </a:xfrm>
-          <a:prstGeom prst="ellipse">
-            <a:avLst/>
-          </a:prstGeom>
-        </p:spPr>
-        <p:style>
-          <a:lnRef idx="2">
-            <a:schemeClr val="accent1">
-              <a:shade val="50000"/>
-            </a:schemeClr>
-          </a:lnRef>
-          <a:fillRef idx="1">
-            <a:schemeClr val="accent1"/>
-          </a:fillRef>
-          <a:effectRef idx="0">
-            <a:schemeClr val="accent1"/>
-          </a:effectRef>
-          <a:fontRef idx="minor">
-            <a:schemeClr val="lt1"/>
-          </a:fontRef>
-        </p:style>
-        <p:txBody>
-          <a:bodyPr rtlCol="1" anchor="ctr"/>
-          <a:lstStyle/>
-          <a:p>
-            <a:pPr algn="ctr"/>
-            <a:r>
-              <a:rPr lang="en-US" dirty="0" smtClean="0"/>
-              <a:t>Show spec environment </a:t>
-            </a:r>
-            <a:endParaRPr lang="he-IL" dirty="0"/>
-          </a:p>
-        </p:txBody>
-      </p:sp>
-      <p:cxnSp>
-        <p:nvCxnSpPr>
-          <p:cNvPr id="17" name="Elbow Connector 16"/>
-          <p:cNvCxnSpPr>
-            <a:stCxn id="15" idx="4"/>
-            <a:endCxn id="7" idx="3"/>
-          </p:cNvCxnSpPr>
-          <p:nvPr/>
-        </p:nvCxnSpPr>
-        <p:spPr>
-          <a:xfrm rot="5400000" flipH="1" flipV="1">
-            <a:off x="2346029" y="2307385"/>
-            <a:ext cx="6056989" cy="2379519"/>
-          </a:xfrm>
-          <a:prstGeom prst="bentConnector4">
-            <a:avLst>
-              <a:gd name="adj1" fmla="val -3774"/>
-              <a:gd name="adj2" fmla="val 134760"/>
-            </a:avLst>
-          </a:prstGeom>
-          <a:ln>
-            <a:tailEnd type="triangle"/>
-          </a:ln>
-        </p:spPr>
-        <p:style>
-          <a:lnRef idx="1">
-            <a:schemeClr val="accent1"/>
-          </a:lnRef>
-          <a:fillRef idx="0">
-            <a:schemeClr val="accent1"/>
-          </a:fillRef>
-          <a:effectRef idx="0">
-            <a:schemeClr val="accent1"/>
-          </a:effectRef>
-          <a:fontRef idx="minor">
-            <a:schemeClr val="tx1"/>
-          </a:fontRef>
-        </p:style>
-      </p:cxnSp>
       <p:cxnSp>
         <p:nvCxnSpPr>
           <p:cNvPr id="22" name="Elbow Connector 21"/>
           <p:cNvCxnSpPr>
-            <a:stCxn id="4" idx="1"/>
-            <a:endCxn id="6" idx="0"/>
+            <a:cxnSpLocks/>
           </p:cNvCxnSpPr>
           <p:nvPr/>
         </p:nvCxnSpPr>
         <p:spPr>
-          <a:xfrm rot="10800000" flipV="1">
-            <a:off x="2209108" y="468649"/>
-            <a:ext cx="1370215" cy="396959"/>
-          </a:xfrm>
-          <a:prstGeom prst="bentConnector2">
-            <a:avLst/>
-          </a:prstGeom>
-          <a:ln>
-            <a:tailEnd type="triangle"/>
-          </a:ln>
-        </p:spPr>
-        <p:style>
-          <a:lnRef idx="1">
-            <a:schemeClr val="accent1"/>
-          </a:lnRef>
-          <a:fillRef idx="0">
-            <a:schemeClr val="accent1"/>
-          </a:fillRef>
-          <a:effectRef idx="0">
-            <a:schemeClr val="accent1"/>
-          </a:effectRef>
-          <a:fontRef idx="minor">
-            <a:schemeClr val="tx1"/>
-          </a:fontRef>
-        </p:style>
-      </p:cxnSp>
-      <p:cxnSp>
-        <p:nvCxnSpPr>
-          <p:cNvPr id="27" name="Straight Arrow Connector 26"/>
-          <p:cNvCxnSpPr>
-            <a:stCxn id="4" idx="3"/>
-            <a:endCxn id="7" idx="1"/>
-          </p:cNvCxnSpPr>
-          <p:nvPr/>
-        </p:nvCxnSpPr>
-        <p:spPr>
-          <a:xfrm>
-            <a:off x="4809605" y="468650"/>
-            <a:ext cx="718359" cy="0"/>
-          </a:xfrm>
-          <a:prstGeom prst="straightConnector1">
-            <a:avLst/>
+          <a:xfrm rot="5400000">
+            <a:off x="2986481" y="-120368"/>
+            <a:ext cx="427704" cy="1942361"/>
+          </a:xfrm>
+          <a:prstGeom prst="bentConnector3">
+            <a:avLst>
+              <a:gd name="adj1" fmla="val 50000"/>
+            </a:avLst>
           </a:prstGeom>
           <a:ln>
             <a:tailEnd type="triangle"/>
@@ -3623,15 +3552,16 @@
         <p:nvCxnSpPr>
           <p:cNvPr id="31" name="Straight Arrow Connector 30"/>
           <p:cNvCxnSpPr>
+            <a:cxnSpLocks/>
             <a:stCxn id="7" idx="2"/>
             <a:endCxn id="8" idx="0"/>
           </p:cNvCxnSpPr>
           <p:nvPr/>
         </p:nvCxnSpPr>
         <p:spPr>
-          <a:xfrm>
-            <a:off x="6046124" y="694080"/>
-            <a:ext cx="0" cy="190855"/>
+          <a:xfrm flipH="1">
+            <a:off x="6028025" y="1462059"/>
+            <a:ext cx="20778" cy="176610"/>
           </a:xfrm>
           <a:prstGeom prst="straightConnector1">
             <a:avLst/>
@@ -3659,15 +3589,16 @@
         <p:nvCxnSpPr>
           <p:cNvPr id="33" name="Straight Arrow Connector 32"/>
           <p:cNvCxnSpPr>
+            <a:cxnSpLocks/>
             <a:stCxn id="8" idx="4"/>
             <a:endCxn id="9" idx="0"/>
           </p:cNvCxnSpPr>
           <p:nvPr/>
         </p:nvCxnSpPr>
         <p:spPr>
-          <a:xfrm flipH="1">
-            <a:off x="6041276" y="1635993"/>
-            <a:ext cx="4848" cy="149242"/>
+          <a:xfrm>
+            <a:off x="6028025" y="2389727"/>
+            <a:ext cx="0" cy="256503"/>
           </a:xfrm>
           <a:prstGeom prst="straightConnector1">
             <a:avLst/>
@@ -3695,6 +3626,7 @@
         <p:nvCxnSpPr>
           <p:cNvPr id="36" name="Straight Arrow Connector 35"/>
           <p:cNvCxnSpPr>
+            <a:cxnSpLocks/>
             <a:stCxn id="6" idx="4"/>
             <a:endCxn id="5" idx="0"/>
           </p:cNvCxnSpPr>
@@ -3702,82 +3634,10 @@
         </p:nvCxnSpPr>
         <p:spPr>
           <a:xfrm>
-            <a:off x="2209107" y="1655318"/>
-            <a:ext cx="0" cy="187865"/>
+            <a:off x="2229152" y="1840849"/>
+            <a:ext cx="0" cy="816698"/>
           </a:xfrm>
           <a:prstGeom prst="straightConnector1">
-            <a:avLst/>
-          </a:prstGeom>
-          <a:ln>
-            <a:tailEnd type="triangle"/>
-          </a:ln>
-        </p:spPr>
-        <p:style>
-          <a:lnRef idx="1">
-            <a:schemeClr val="accent1"/>
-          </a:lnRef>
-          <a:fillRef idx="0">
-            <a:schemeClr val="accent1"/>
-          </a:fillRef>
-          <a:effectRef idx="0">
-            <a:schemeClr val="accent1"/>
-          </a:effectRef>
-          <a:fontRef idx="minor">
-            <a:schemeClr val="tx1"/>
-          </a:fontRef>
-        </p:style>
-      </p:cxnSp>
-      <p:cxnSp>
-        <p:nvCxnSpPr>
-          <p:cNvPr id="39" name="Elbow Connector 38"/>
-          <p:cNvCxnSpPr>
-            <a:stCxn id="5" idx="2"/>
-            <a:endCxn id="10" idx="2"/>
-          </p:cNvCxnSpPr>
-          <p:nvPr/>
-        </p:nvCxnSpPr>
-        <p:spPr>
-          <a:xfrm rot="16200000" flipH="1">
-            <a:off x="2030424" y="2556580"/>
-            <a:ext cx="485520" cy="128155"/>
-          </a:xfrm>
-          <a:prstGeom prst="bentConnector2">
-            <a:avLst/>
-          </a:prstGeom>
-          <a:ln>
-            <a:tailEnd type="triangle"/>
-          </a:ln>
-        </p:spPr>
-        <p:style>
-          <a:lnRef idx="1">
-            <a:schemeClr val="accent1"/>
-          </a:lnRef>
-          <a:fillRef idx="0">
-            <a:schemeClr val="accent1"/>
-          </a:fillRef>
-          <a:effectRef idx="0">
-            <a:schemeClr val="accent1"/>
-          </a:effectRef>
-          <a:fontRef idx="minor">
-            <a:schemeClr val="tx1"/>
-          </a:fontRef>
-        </p:style>
-      </p:cxnSp>
-      <p:cxnSp>
-        <p:nvCxnSpPr>
-          <p:cNvPr id="42" name="Elbow Connector 41"/>
-          <p:cNvCxnSpPr>
-            <a:stCxn id="9" idx="2"/>
-            <a:endCxn id="10" idx="6"/>
-          </p:cNvCxnSpPr>
-          <p:nvPr/>
-        </p:nvCxnSpPr>
-        <p:spPr>
-          <a:xfrm rot="5400000">
-            <a:off x="5652817" y="2474959"/>
-            <a:ext cx="543468" cy="233450"/>
-          </a:xfrm>
-          <a:prstGeom prst="bentConnector2">
             <a:avLst/>
           </a:prstGeom>
           <a:ln>
@@ -3803,6 +3663,7 @@
         <p:nvCxnSpPr>
           <p:cNvPr id="44" name="Straight Arrow Connector 43"/>
           <p:cNvCxnSpPr>
+            <a:cxnSpLocks/>
             <a:stCxn id="10" idx="4"/>
             <a:endCxn id="11" idx="0"/>
           </p:cNvCxnSpPr>
@@ -3810,8 +3671,8 @@
         </p:nvCxnSpPr>
         <p:spPr>
           <a:xfrm flipH="1">
-            <a:off x="4067695" y="3258272"/>
-            <a:ext cx="4849" cy="306440"/>
+            <a:off x="4066221" y="3308527"/>
+            <a:ext cx="1" cy="321805"/>
           </a:xfrm>
           <a:prstGeom prst="straightConnector1">
             <a:avLst/>
@@ -3839,15 +3700,16 @@
         <p:nvCxnSpPr>
           <p:cNvPr id="47" name="Straight Arrow Connector 46"/>
           <p:cNvCxnSpPr>
+            <a:cxnSpLocks/>
             <a:stCxn id="11" idx="2"/>
             <a:endCxn id="12" idx="0"/>
           </p:cNvCxnSpPr>
           <p:nvPr/>
         </p:nvCxnSpPr>
         <p:spPr>
-          <a:xfrm flipH="1">
-            <a:off x="4067694" y="4088414"/>
-            <a:ext cx="1" cy="201895"/>
+          <a:xfrm>
+            <a:off x="4066221" y="4154034"/>
+            <a:ext cx="6120" cy="200327"/>
           </a:xfrm>
           <a:prstGeom prst="straightConnector1">
             <a:avLst/>
@@ -3875,6 +3737,7 @@
         <p:nvCxnSpPr>
           <p:cNvPr id="56" name="Elbow Connector 55"/>
           <p:cNvCxnSpPr>
+            <a:cxnSpLocks/>
             <a:stCxn id="12" idx="3"/>
             <a:endCxn id="13" idx="0"/>
           </p:cNvCxnSpPr>
@@ -3882,8 +3745,8 @@
         </p:nvCxnSpPr>
         <p:spPr>
           <a:xfrm>
-            <a:off x="4667249" y="4635287"/>
-            <a:ext cx="1226474" cy="200479"/>
+            <a:off x="4678017" y="4699339"/>
+            <a:ext cx="1212108" cy="321958"/>
           </a:xfrm>
           <a:prstGeom prst="bentConnector2">
             <a:avLst/>
@@ -3911,6 +3774,7 @@
         <p:nvCxnSpPr>
           <p:cNvPr id="59" name="Elbow Connector 58"/>
           <p:cNvCxnSpPr>
+            <a:cxnSpLocks/>
             <a:stCxn id="12" idx="1"/>
             <a:endCxn id="14" idx="0"/>
           </p:cNvCxnSpPr>
@@ -3918,8 +3782,8 @@
         </p:nvCxnSpPr>
         <p:spPr>
           <a:xfrm rot="10800000" flipV="1">
-            <a:off x="2296739" y="4635286"/>
-            <a:ext cx="1171401" cy="200479"/>
+            <a:off x="2217159" y="4699339"/>
+            <a:ext cx="1249506" cy="321958"/>
           </a:xfrm>
           <a:prstGeom prst="bentConnector2">
             <a:avLst/>
@@ -3947,6 +3811,7 @@
         <p:nvCxnSpPr>
           <p:cNvPr id="62" name="Elbow Connector 61"/>
           <p:cNvCxnSpPr>
+            <a:cxnSpLocks/>
             <a:stCxn id="14" idx="4"/>
             <a:endCxn id="15" idx="2"/>
           </p:cNvCxnSpPr>
@@ -3954,8 +3819,8 @@
         </p:nvCxnSpPr>
         <p:spPr>
           <a:xfrm rot="16200000" flipH="1">
-            <a:off x="2485962" y="5437821"/>
-            <a:ext cx="499583" cy="878030"/>
+            <a:off x="2439547" y="5590188"/>
+            <a:ext cx="499583" cy="944358"/>
           </a:xfrm>
           <a:prstGeom prst="bentConnector2">
             <a:avLst/>
@@ -3983,6 +3848,7 @@
         <p:nvCxnSpPr>
           <p:cNvPr id="66" name="Elbow Connector 65"/>
           <p:cNvCxnSpPr>
+            <a:cxnSpLocks/>
             <a:stCxn id="13" idx="4"/>
             <a:endCxn id="15" idx="6"/>
           </p:cNvCxnSpPr>
@@ -3990,10 +3856,194 @@
         </p:nvCxnSpPr>
         <p:spPr>
           <a:xfrm rot="5400000">
-            <a:off x="5294451" y="5527355"/>
-            <a:ext cx="499583" cy="698962"/>
+            <a:off x="5093449" y="5515482"/>
+            <a:ext cx="499583" cy="1093771"/>
           </a:xfrm>
           <a:prstGeom prst="bentConnector2">
+            <a:avLst/>
+          </a:prstGeom>
+          <a:ln>
+            <a:tailEnd type="triangle"/>
+          </a:ln>
+        </p:spPr>
+        <p:style>
+          <a:lnRef idx="1">
+            <a:schemeClr val="accent1"/>
+          </a:lnRef>
+          <a:fillRef idx="0">
+            <a:schemeClr val="accent1"/>
+          </a:fillRef>
+          <a:effectRef idx="0">
+            <a:schemeClr val="accent1"/>
+          </a:effectRef>
+          <a:fontRef idx="minor">
+            <a:schemeClr val="tx1"/>
+          </a:fontRef>
+        </p:style>
+      </p:cxnSp>
+      <p:cxnSp>
+        <p:nvCxnSpPr>
+          <p:cNvPr id="80" name="מחבר: מרפקי 79"/>
+          <p:cNvCxnSpPr>
+            <a:cxnSpLocks/>
+          </p:cNvCxnSpPr>
+          <p:nvPr/>
+        </p:nvCxnSpPr>
+        <p:spPr>
+          <a:xfrm rot="16200000" flipH="1">
+            <a:off x="4919330" y="-84625"/>
+            <a:ext cx="360878" cy="1856512"/>
+          </a:xfrm>
+          <a:prstGeom prst="bentConnector3">
+            <a:avLst>
+              <a:gd name="adj1" fmla="val 50000"/>
+            </a:avLst>
+          </a:prstGeom>
+          <a:ln>
+            <a:tailEnd type="triangle"/>
+          </a:ln>
+        </p:spPr>
+        <p:style>
+          <a:lnRef idx="1">
+            <a:schemeClr val="accent1"/>
+          </a:lnRef>
+          <a:fillRef idx="0">
+            <a:schemeClr val="accent1"/>
+          </a:fillRef>
+          <a:effectRef idx="0">
+            <a:schemeClr val="accent1"/>
+          </a:effectRef>
+          <a:fontRef idx="minor">
+            <a:schemeClr val="tx1"/>
+          </a:fontRef>
+        </p:style>
+      </p:cxnSp>
+      <p:cxnSp>
+        <p:nvCxnSpPr>
+          <p:cNvPr id="99" name="מחבר חץ ישר 98"/>
+          <p:cNvCxnSpPr>
+            <a:stCxn id="5" idx="3"/>
+            <a:endCxn id="10" idx="2"/>
+          </p:cNvCxnSpPr>
+          <p:nvPr/>
+        </p:nvCxnSpPr>
+        <p:spPr>
+          <a:xfrm flipV="1">
+            <a:off x="2960672" y="2913673"/>
+            <a:ext cx="286055" cy="11232"/>
+          </a:xfrm>
+          <a:prstGeom prst="straightConnector1">
+            <a:avLst/>
+          </a:prstGeom>
+          <a:ln>
+            <a:tailEnd type="triangle"/>
+          </a:ln>
+        </p:spPr>
+        <p:style>
+          <a:lnRef idx="1">
+            <a:schemeClr val="accent1"/>
+          </a:lnRef>
+          <a:fillRef idx="0">
+            <a:schemeClr val="accent1"/>
+          </a:fillRef>
+          <a:effectRef idx="0">
+            <a:schemeClr val="accent1"/>
+          </a:effectRef>
+          <a:fontRef idx="minor">
+            <a:schemeClr val="tx1"/>
+          </a:fontRef>
+        </p:style>
+      </p:cxnSp>
+      <p:cxnSp>
+        <p:nvCxnSpPr>
+          <p:cNvPr id="101" name="מחבר חץ ישר 100"/>
+          <p:cNvCxnSpPr>
+            <a:cxnSpLocks/>
+            <a:stCxn id="9" idx="1"/>
+            <a:endCxn id="10" idx="6"/>
+          </p:cNvCxnSpPr>
+          <p:nvPr/>
+        </p:nvCxnSpPr>
+        <p:spPr>
+          <a:xfrm flipH="1">
+            <a:off x="4885716" y="2913588"/>
+            <a:ext cx="472812" cy="85"/>
+          </a:xfrm>
+          <a:prstGeom prst="straightConnector1">
+            <a:avLst/>
+          </a:prstGeom>
+          <a:ln>
+            <a:tailEnd type="triangle"/>
+          </a:ln>
+        </p:spPr>
+        <p:style>
+          <a:lnRef idx="1">
+            <a:schemeClr val="accent1"/>
+          </a:lnRef>
+          <a:fillRef idx="0">
+            <a:schemeClr val="accent1"/>
+          </a:fillRef>
+          <a:effectRef idx="0">
+            <a:schemeClr val="accent1"/>
+          </a:effectRef>
+          <a:fontRef idx="minor">
+            <a:schemeClr val="tx1"/>
+          </a:fontRef>
+        </p:style>
+      </p:cxnSp>
+      <p:cxnSp>
+        <p:nvCxnSpPr>
+          <p:cNvPr id="144" name="מחבר: מרפקי 143"/>
+          <p:cNvCxnSpPr>
+            <a:cxnSpLocks/>
+          </p:cNvCxnSpPr>
+          <p:nvPr/>
+        </p:nvCxnSpPr>
+        <p:spPr>
+          <a:xfrm rot="5400000" flipH="1" flipV="1">
+            <a:off x="1274505" y="3199021"/>
+            <a:ext cx="6216581" cy="807718"/>
+          </a:xfrm>
+          <a:prstGeom prst="bentConnector4">
+            <a:avLst>
+              <a:gd name="adj1" fmla="val -1333"/>
+              <a:gd name="adj2" fmla="val 396936"/>
+            </a:avLst>
+          </a:prstGeom>
+          <a:ln>
+            <a:tailEnd type="triangle"/>
+          </a:ln>
+        </p:spPr>
+        <p:style>
+          <a:lnRef idx="1">
+            <a:schemeClr val="accent1"/>
+          </a:lnRef>
+          <a:fillRef idx="0">
+            <a:schemeClr val="accent1"/>
+          </a:fillRef>
+          <a:effectRef idx="0">
+            <a:schemeClr val="accent1"/>
+          </a:effectRef>
+          <a:fontRef idx="minor">
+            <a:schemeClr val="tx1"/>
+          </a:fontRef>
+        </p:style>
+      </p:cxnSp>
+      <p:cxnSp>
+        <p:nvCxnSpPr>
+          <p:cNvPr id="163" name="מחבר חץ ישר 162"/>
+          <p:cNvCxnSpPr>
+            <a:cxnSpLocks/>
+            <a:endCxn id="4" idx="0"/>
+          </p:cNvCxnSpPr>
+          <p:nvPr/>
+        </p:nvCxnSpPr>
+        <p:spPr>
+          <a:xfrm>
+            <a:off x="4171513" y="91655"/>
+            <a:ext cx="0" cy="274087"/>
+          </a:xfrm>
+          <a:prstGeom prst="straightConnector1">
             <a:avLst/>
           </a:prstGeom>
           <a:ln>
@@ -4025,13 +4075,6 @@
   <p:clrMapOvr>
     <a:masterClrMapping/>
   </p:clrMapOvr>
-  <p:timing>
-    <p:tnLst>
-      <p:par>
-        <p:cTn id="1" dur="indefinite" restart="never" nodeType="tmRoot"/>
-      </p:par>
-    </p:tnLst>
-  </p:timing>
 </p:sld>
 </file>
 

</xml_diff>